<commit_message>
FIRST PART OF THE SYSTEM USE CASES ARE IMPLEMENTED
</commit_message>
<xml_diff>
--- a/fordcs-docs/EDUp FORDCS-V1.0 Project-v2022.04/1.0-Customer Requirements/EDUp-FORDCS-V1.0 Customer-Requirements-v2022.04.pptx
+++ b/fordcs-docs/EDUp FORDCS-V1.0 Project-v2022.04/1.0-Customer Requirements/EDUp-FORDCS-V1.0 Customer-Requirements-v2022.04.pptx
@@ -528,7 +528,7 @@
           <a:p>
             <a:fld id="{F5BA542F-B73B-47E7-BABB-8194D77513EA}" type="datetimeFigureOut">
               <a:rPr lang="en-GB" smtClean="0"/>
-              <a:t>29/04/2022</a:t>
+              <a:t>24/06/2022</a:t>
             </a:fld>
             <a:endParaRPr lang="en-GB" dirty="0"/>
           </a:p>
@@ -707,7 +707,7 @@
           <a:p>
             <a:fld id="{F5BA542F-B73B-47E7-BABB-8194D77513EA}" type="datetimeFigureOut">
               <a:rPr lang="en-GB" smtClean="0"/>
-              <a:t>29/04/2022</a:t>
+              <a:t>24/06/2022</a:t>
             </a:fld>
             <a:endParaRPr lang="en-GB" dirty="0"/>
           </a:p>
@@ -887,7 +887,7 @@
           <a:p>
             <a:fld id="{F5BA542F-B73B-47E7-BABB-8194D77513EA}" type="datetimeFigureOut">
               <a:rPr lang="en-GB" smtClean="0"/>
-              <a:t>29/04/2022</a:t>
+              <a:t>24/06/2022</a:t>
             </a:fld>
             <a:endParaRPr lang="en-GB" dirty="0"/>
           </a:p>
@@ -1057,7 +1057,7 @@
           <a:p>
             <a:fld id="{F5BA542F-B73B-47E7-BABB-8194D77513EA}" type="datetimeFigureOut">
               <a:rPr lang="en-GB" smtClean="0"/>
-              <a:t>29/04/2022</a:t>
+              <a:t>24/06/2022</a:t>
             </a:fld>
             <a:endParaRPr lang="en-GB" dirty="0"/>
           </a:p>
@@ -1370,7 +1370,7 @@
           <a:p>
             <a:fld id="{F5BA542F-B73B-47E7-BABB-8194D77513EA}" type="datetimeFigureOut">
               <a:rPr lang="en-GB" smtClean="0"/>
-              <a:t>29/04/2022</a:t>
+              <a:t>24/06/2022</a:t>
             </a:fld>
             <a:endParaRPr lang="en-GB" dirty="0"/>
           </a:p>
@@ -1756,7 +1756,7 @@
           <a:p>
             <a:fld id="{F5BA542F-B73B-47E7-BABB-8194D77513EA}" type="datetimeFigureOut">
               <a:rPr lang="en-GB" smtClean="0"/>
-              <a:t>29/04/2022</a:t>
+              <a:t>24/06/2022</a:t>
             </a:fld>
             <a:endParaRPr lang="en-GB" dirty="0"/>
           </a:p>
@@ -2190,7 +2190,7 @@
           <a:p>
             <a:fld id="{F5BA542F-B73B-47E7-BABB-8194D77513EA}" type="datetimeFigureOut">
               <a:rPr lang="en-GB" smtClean="0"/>
-              <a:t>29/04/2022</a:t>
+              <a:t>24/06/2022</a:t>
             </a:fld>
             <a:endParaRPr lang="en-GB" dirty="0"/>
           </a:p>
@@ -2308,7 +2308,7 @@
           <a:p>
             <a:fld id="{F5BA542F-B73B-47E7-BABB-8194D77513EA}" type="datetimeFigureOut">
               <a:rPr lang="en-GB" smtClean="0"/>
-              <a:t>29/04/2022</a:t>
+              <a:t>24/06/2022</a:t>
             </a:fld>
             <a:endParaRPr lang="en-GB" dirty="0"/>
           </a:p>
@@ -2403,7 +2403,7 @@
           <a:p>
             <a:fld id="{F5BA542F-B73B-47E7-BABB-8194D77513EA}" type="datetimeFigureOut">
               <a:rPr lang="en-GB" smtClean="0"/>
-              <a:t>29/04/2022</a:t>
+              <a:t>24/06/2022</a:t>
             </a:fld>
             <a:endParaRPr lang="en-GB" dirty="0"/>
           </a:p>
@@ -2753,7 +2753,7 @@
           <a:p>
             <a:fld id="{F5BA542F-B73B-47E7-BABB-8194D77513EA}" type="datetimeFigureOut">
               <a:rPr lang="en-GB" smtClean="0"/>
-              <a:t>29/04/2022</a:t>
+              <a:t>24/06/2022</a:t>
             </a:fld>
             <a:endParaRPr lang="en-GB" dirty="0"/>
           </a:p>
@@ -3178,7 +3178,7 @@
           <a:p>
             <a:fld id="{F5BA542F-B73B-47E7-BABB-8194D77513EA}" type="datetimeFigureOut">
               <a:rPr lang="en-GB" smtClean="0"/>
-              <a:t>29/04/2022</a:t>
+              <a:t>24/06/2022</a:t>
             </a:fld>
             <a:endParaRPr lang="en-GB" dirty="0"/>
           </a:p>
@@ -3459,7 +3459,7 @@
           <a:p>
             <a:fld id="{F5BA542F-B73B-47E7-BABB-8194D77513EA}" type="datetimeFigureOut">
               <a:rPr lang="en-GB" smtClean="0"/>
-              <a:t>29/04/2022</a:t>
+              <a:t>24/06/2022</a:t>
             </a:fld>
             <a:endParaRPr lang="en-GB" dirty="0"/>
           </a:p>

</xml_diff>